<commit_message>
Updated poster version 2.0
</commit_message>
<xml_diff>
--- a/doc/ASAP_capstone.pptx
+++ b/doc/ASAP_capstone.pptx
@@ -243,7 +243,7 @@
           <a:p>
             <a:fld id="{334C27A1-BEB2-C84C-8355-1158A44B1DD2}" type="datetimeFigureOut">
               <a:rPr lang="en-US" smtClean="0"/>
-              <a:t>6/19/18</a:t>
+              <a:t>6/20/18</a:t>
             </a:fld>
             <a:endParaRPr lang="en-US"/>
           </a:p>
@@ -413,7 +413,7 @@
           <a:p>
             <a:fld id="{334C27A1-BEB2-C84C-8355-1158A44B1DD2}" type="datetimeFigureOut">
               <a:rPr lang="en-US" smtClean="0"/>
-              <a:t>6/19/18</a:t>
+              <a:t>6/20/18</a:t>
             </a:fld>
             <a:endParaRPr lang="en-US"/>
           </a:p>
@@ -593,7 +593,7 @@
           <a:p>
             <a:fld id="{334C27A1-BEB2-C84C-8355-1158A44B1DD2}" type="datetimeFigureOut">
               <a:rPr lang="en-US" smtClean="0"/>
-              <a:t>6/19/18</a:t>
+              <a:t>6/20/18</a:t>
             </a:fld>
             <a:endParaRPr lang="en-US"/>
           </a:p>
@@ -763,7 +763,7 @@
           <a:p>
             <a:fld id="{334C27A1-BEB2-C84C-8355-1158A44B1DD2}" type="datetimeFigureOut">
               <a:rPr lang="en-US" smtClean="0"/>
-              <a:t>6/19/18</a:t>
+              <a:t>6/20/18</a:t>
             </a:fld>
             <a:endParaRPr lang="en-US"/>
           </a:p>
@@ -1007,7 +1007,7 @@
           <a:p>
             <a:fld id="{334C27A1-BEB2-C84C-8355-1158A44B1DD2}" type="datetimeFigureOut">
               <a:rPr lang="en-US" smtClean="0"/>
-              <a:t>6/19/18</a:t>
+              <a:t>6/20/18</a:t>
             </a:fld>
             <a:endParaRPr lang="en-US"/>
           </a:p>
@@ -1239,7 +1239,7 @@
           <a:p>
             <a:fld id="{334C27A1-BEB2-C84C-8355-1158A44B1DD2}" type="datetimeFigureOut">
               <a:rPr lang="en-US" smtClean="0"/>
-              <a:t>6/19/18</a:t>
+              <a:t>6/20/18</a:t>
             </a:fld>
             <a:endParaRPr lang="en-US"/>
           </a:p>
@@ -1606,7 +1606,7 @@
           <a:p>
             <a:fld id="{334C27A1-BEB2-C84C-8355-1158A44B1DD2}" type="datetimeFigureOut">
               <a:rPr lang="en-US" smtClean="0"/>
-              <a:t>6/19/18</a:t>
+              <a:t>6/20/18</a:t>
             </a:fld>
             <a:endParaRPr lang="en-US"/>
           </a:p>
@@ -1724,7 +1724,7 @@
           <a:p>
             <a:fld id="{334C27A1-BEB2-C84C-8355-1158A44B1DD2}" type="datetimeFigureOut">
               <a:rPr lang="en-US" smtClean="0"/>
-              <a:t>6/19/18</a:t>
+              <a:t>6/20/18</a:t>
             </a:fld>
             <a:endParaRPr lang="en-US"/>
           </a:p>
@@ -1819,7 +1819,7 @@
           <a:p>
             <a:fld id="{334C27A1-BEB2-C84C-8355-1158A44B1DD2}" type="datetimeFigureOut">
               <a:rPr lang="en-US" smtClean="0"/>
-              <a:t>6/19/18</a:t>
+              <a:t>6/20/18</a:t>
             </a:fld>
             <a:endParaRPr lang="en-US"/>
           </a:p>
@@ -2096,7 +2096,7 @@
           <a:p>
             <a:fld id="{334C27A1-BEB2-C84C-8355-1158A44B1DD2}" type="datetimeFigureOut">
               <a:rPr lang="en-US" smtClean="0"/>
-              <a:t>6/19/18</a:t>
+              <a:t>6/20/18</a:t>
             </a:fld>
             <a:endParaRPr lang="en-US"/>
           </a:p>
@@ -2353,7 +2353,7 @@
           <a:p>
             <a:fld id="{334C27A1-BEB2-C84C-8355-1158A44B1DD2}" type="datetimeFigureOut">
               <a:rPr lang="en-US" smtClean="0"/>
-              <a:t>6/19/18</a:t>
+              <a:t>6/20/18</a:t>
             </a:fld>
             <a:endParaRPr lang="en-US"/>
           </a:p>
@@ -2566,7 +2566,7 @@
           <a:p>
             <a:fld id="{334C27A1-BEB2-C84C-8355-1158A44B1DD2}" type="datetimeFigureOut">
               <a:rPr lang="en-US" smtClean="0"/>
-              <a:t>6/19/18</a:t>
+              <a:t>6/20/18</a:t>
             </a:fld>
             <a:endParaRPr lang="en-US"/>
           </a:p>
@@ -3509,7 +3509,7 @@
         </p:nvSpPr>
         <p:spPr>
           <a:xfrm>
-            <a:off x="31043751" y="4677655"/>
+            <a:off x="30541200" y="4802301"/>
             <a:ext cx="11756968" cy="1569660"/>
           </a:xfrm>
           <a:prstGeom prst="rect">
@@ -3650,15 +3650,7 @@
             </a:r>
             <a:r>
               <a:rPr lang="en-US" sz="4000" dirty="0"/>
-              <a:t> Desktop software</a:t>
-            </a:r>
-            <a:r>
-              <a:rPr lang="en-US" sz="4000" baseline="30000" dirty="0"/>
-              <a:t>[1]</a:t>
-            </a:r>
-            <a:r>
-              <a:rPr lang="en-US" sz="4000" dirty="0"/>
-              <a:t> , such as aspect, slope and solar radiation. The input is Light Detection and Ranging (LIDAR) data, a remote sensing method utilized by the government. The output is </a:t>
+              <a:t> Desktop software, such as aspect, slope and solar radiation. The input is Light Detection and Ranging (LIDAR) data, a remote sensing method utilized by the government. The output is </a:t>
             </a:r>
             <a:r>
               <a:rPr lang="en-US" sz="4000" dirty="0" err="1"/>
@@ -3671,86 +3663,107 @@
           </a:p>
         </p:txBody>
       </p:sp>
-      <p:sp>
-        <p:nvSpPr>
-          <p:cNvPr id="24" name="TextBox 23">
+      <p:grpSp>
+        <p:nvGrpSpPr>
+          <p:cNvPr id="14" name="Group 13">
             <a:extLst>
               <a:ext uri="{FF2B5EF4-FFF2-40B4-BE49-F238E27FC236}">
-                <a16:creationId xmlns:a16="http://schemas.microsoft.com/office/drawing/2014/main" id="{2542872F-456D-1D4B-9F3B-DB802A3450E9}"/>
+                <a16:creationId xmlns:a16="http://schemas.microsoft.com/office/drawing/2014/main" id="{B899183F-4919-9447-BB1E-1083E73CA025}"/>
               </a:ext>
             </a:extLst>
           </p:cNvPr>
-          <p:cNvSpPr txBox="1"/>
+          <p:cNvGrpSpPr/>
           <p:nvPr/>
-        </p:nvSpPr>
-        <p:spPr>
-          <a:xfrm>
-            <a:off x="20090597" y="8339328"/>
-            <a:ext cx="8842485" cy="1015663"/>
-          </a:xfrm>
-          <a:prstGeom prst="rect">
-            <a:avLst/>
-          </a:prstGeom>
-          <a:noFill/>
-        </p:spPr>
-        <p:txBody>
-          <a:bodyPr wrap="none" rtlCol="0">
-            <a:spAutoFit/>
-          </a:bodyPr>
-          <a:lstStyle/>
-          <a:p>
-            <a:r>
-              <a:rPr lang="en-US" sz="6000" dirty="0"/>
-              <a:t>Model builder from </a:t>
-            </a:r>
-            <a:r>
-              <a:rPr lang="en-US" sz="6000" dirty="0" err="1"/>
-              <a:t>Jingtian</a:t>
-            </a:r>
-            <a:endParaRPr lang="en-US" sz="6000" dirty="0"/>
-          </a:p>
-        </p:txBody>
-      </p:sp>
-      <p:sp>
-        <p:nvSpPr>
-          <p:cNvPr id="25" name="TextBox 24">
-            <a:extLst>
-              <a:ext uri="{FF2B5EF4-FFF2-40B4-BE49-F238E27FC236}">
-                <a16:creationId xmlns:a16="http://schemas.microsoft.com/office/drawing/2014/main" id="{06337C75-2175-6640-A8CE-11E362B23A5A}"/>
-              </a:ext>
-            </a:extLst>
-          </p:cNvPr>
-          <p:cNvSpPr txBox="1"/>
-          <p:nvPr/>
-        </p:nvSpPr>
-        <p:spPr>
-          <a:xfrm>
-            <a:off x="21793018" y="9691284"/>
-            <a:ext cx="5437642" cy="1015663"/>
-          </a:xfrm>
-          <a:prstGeom prst="rect">
-            <a:avLst/>
-          </a:prstGeom>
-          <a:noFill/>
-        </p:spPr>
-        <p:txBody>
-          <a:bodyPr wrap="none" rtlCol="0">
-            <a:spAutoFit/>
-          </a:bodyPr>
-          <a:lstStyle/>
-          <a:p>
-            <a:r>
-              <a:rPr lang="en-US" sz="6000" dirty="0"/>
-              <a:t>Workflow </a:t>
-            </a:r>
-            <a:r>
-              <a:rPr lang="en-US" sz="6000" dirty="0" err="1"/>
-              <a:t>XMind</a:t>
-            </a:r>
-            <a:endParaRPr lang="en-US" sz="6000" dirty="0"/>
-          </a:p>
-        </p:txBody>
-      </p:sp>
+        </p:nvGrpSpPr>
+        <p:grpSpPr>
+          <a:xfrm>
+            <a:off x="17524357" y="23559007"/>
+            <a:ext cx="8842485" cy="2367619"/>
+            <a:chOff x="17503317" y="17275519"/>
+            <a:chExt cx="8842485" cy="2367619"/>
+          </a:xfrm>
+        </p:grpSpPr>
+        <p:sp>
+          <p:nvSpPr>
+            <p:cNvPr id="24" name="TextBox 23">
+              <a:extLst>
+                <a:ext uri="{FF2B5EF4-FFF2-40B4-BE49-F238E27FC236}">
+                  <a16:creationId xmlns:a16="http://schemas.microsoft.com/office/drawing/2014/main" id="{2542872F-456D-1D4B-9F3B-DB802A3450E9}"/>
+                </a:ext>
+              </a:extLst>
+            </p:cNvPr>
+            <p:cNvSpPr txBox="1"/>
+            <p:nvPr/>
+          </p:nvSpPr>
+          <p:spPr>
+            <a:xfrm>
+              <a:off x="17503317" y="17275519"/>
+              <a:ext cx="8842485" cy="1015663"/>
+            </a:xfrm>
+            <a:prstGeom prst="rect">
+              <a:avLst/>
+            </a:prstGeom>
+            <a:noFill/>
+          </p:spPr>
+          <p:txBody>
+            <a:bodyPr wrap="none" rtlCol="0">
+              <a:spAutoFit/>
+            </a:bodyPr>
+            <a:lstStyle/>
+            <a:p>
+              <a:r>
+                <a:rPr lang="en-US" sz="6000" dirty="0"/>
+                <a:t>Model builder from </a:t>
+              </a:r>
+              <a:r>
+                <a:rPr lang="en-US" sz="6000" dirty="0" err="1"/>
+                <a:t>Jingtian</a:t>
+              </a:r>
+              <a:endParaRPr lang="en-US" sz="6000" dirty="0"/>
+            </a:p>
+          </p:txBody>
+        </p:sp>
+        <p:sp>
+          <p:nvSpPr>
+            <p:cNvPr id="25" name="TextBox 24">
+              <a:extLst>
+                <a:ext uri="{FF2B5EF4-FFF2-40B4-BE49-F238E27FC236}">
+                  <a16:creationId xmlns:a16="http://schemas.microsoft.com/office/drawing/2014/main" id="{06337C75-2175-6640-A8CE-11E362B23A5A}"/>
+                </a:ext>
+              </a:extLst>
+            </p:cNvPr>
+            <p:cNvSpPr txBox="1"/>
+            <p:nvPr/>
+          </p:nvSpPr>
+          <p:spPr>
+            <a:xfrm>
+              <a:off x="19205738" y="18627475"/>
+              <a:ext cx="5437642" cy="1015663"/>
+            </a:xfrm>
+            <a:prstGeom prst="rect">
+              <a:avLst/>
+            </a:prstGeom>
+            <a:noFill/>
+          </p:spPr>
+          <p:txBody>
+            <a:bodyPr wrap="none" rtlCol="0">
+              <a:spAutoFit/>
+            </a:bodyPr>
+            <a:lstStyle/>
+            <a:p>
+              <a:r>
+                <a:rPr lang="en-US" sz="6000" dirty="0"/>
+                <a:t>Workflow </a:t>
+              </a:r>
+              <a:r>
+                <a:rPr lang="en-US" sz="6000" dirty="0" err="1"/>
+                <a:t>XMind</a:t>
+              </a:r>
+              <a:endParaRPr lang="en-US" sz="6000" dirty="0"/>
+            </a:p>
+          </p:txBody>
+        </p:sp>
+      </p:grpSp>
       <p:sp>
         <p:nvSpPr>
           <p:cNvPr id="26" name="TextBox 25">
@@ -3765,7 +3778,7 @@
         </p:nvSpPr>
         <p:spPr>
           <a:xfrm>
-            <a:off x="34125407" y="6719611"/>
+            <a:off x="34529702" y="14658699"/>
             <a:ext cx="6741823" cy="3785652"/>
           </a:xfrm>
           <a:prstGeom prst="rect">
@@ -3860,7 +3873,7 @@
         <p:spPr>
           <a:xfrm>
             <a:off x="1117924" y="18784665"/>
-            <a:ext cx="13372288" cy="3016210"/>
+            <a:ext cx="13372288" cy="9017853"/>
           </a:xfrm>
           <a:prstGeom prst="rect">
             <a:avLst/>
@@ -3880,47 +3893,226 @@
             </a:pPr>
             <a:r>
               <a:rPr lang="en-US" sz="4000" dirty="0"/>
-              <a:t>In this case, we </a:t>
-            </a:r>
-          </a:p>
-          <a:p>
-            <a:pPr marL="742950" indent="-742950" algn="just">
+              <a:t>In order to compute solar energy, three steps are followed to complete the workflow:</a:t>
+            </a:r>
+          </a:p>
+          <a:p>
+            <a:pPr algn="just"/>
+            <a:r>
+              <a:rPr lang="en-US" sz="4000" b="1" dirty="0"/>
+              <a:t>1. Create Masks</a:t>
+            </a:r>
+          </a:p>
+          <a:p>
+            <a:pPr algn="just">
               <a:spcAft>
                 <a:spcPts val="1200"/>
               </a:spcAft>
-              <a:buAutoNum type="arabicPeriod"/>
             </a:pPr>
             <a:r>
               <a:rPr lang="en-US" sz="4000" dirty="0"/>
-              <a:t>Create Masks</a:t>
-            </a:r>
-          </a:p>
-          <a:p>
-            <a:pPr marL="742950" indent="-742950" algn="just">
+              <a:t>First, we need to filter location generating high solar energy. In this case, three conditions are chosen to consider, i.e. </a:t>
+            </a:r>
+            <a:r>
+              <a:rPr lang="en-US" sz="4000" b="1" dirty="0" err="1"/>
+              <a:t>hillshade</a:t>
+            </a:r>
+            <a:r>
+              <a:rPr lang="en-US" sz="4000" b="1" dirty="0"/>
+              <a:t>, aspect and slope</a:t>
+            </a:r>
+            <a:r>
+              <a:rPr lang="en-US" sz="4000" dirty="0"/>
+              <a:t>. </a:t>
+            </a:r>
+            <a:r>
+              <a:rPr lang="en-US" sz="4000" dirty="0" err="1"/>
+              <a:t>Hillshade</a:t>
+            </a:r>
+            <a:r>
+              <a:rPr lang="en-US" sz="4000" dirty="0"/>
+              <a:t> eliminates places where the sun is blocked by other buildings so they cannot receive high solar radiation. The aspect of the solar panels should be south facing or horizontal to have a higher solar power output because Anchorage is located in the northern hemisphere. Slope allows for installing solar panels, which means slope should be less than 35 degrees. All three conditions create masks to detect spots proper to obtain solar energy.</a:t>
+            </a:r>
+          </a:p>
+          <a:p>
+            <a:pPr algn="just">
               <a:spcAft>
                 <a:spcPts val="1200"/>
               </a:spcAft>
-              <a:buAutoNum type="arabicPeriod"/>
             </a:pPr>
             <a:r>
-              <a:rPr lang="en-US" sz="4000" dirty="0"/>
-              <a:t>Calculate solar radiation</a:t>
-            </a:r>
-          </a:p>
-          <a:p>
-            <a:pPr marL="742950" indent="-742950" algn="just">
+              <a:rPr lang="en-US" sz="4000" b="1" dirty="0"/>
+              <a:t>2. Calculate Solar Radiation</a:t>
+            </a:r>
+          </a:p>
+        </p:txBody>
+      </p:sp>
+      <p:sp>
+        <p:nvSpPr>
+          <p:cNvPr id="28" name="TextBox 27">
+            <a:extLst>
+              <a:ext uri="{FF2B5EF4-FFF2-40B4-BE49-F238E27FC236}">
+                <a16:creationId xmlns:a16="http://schemas.microsoft.com/office/drawing/2014/main" id="{6F67B3BF-4CC7-8143-99DC-EF0BBB10F46B}"/>
+              </a:ext>
+            </a:extLst>
+          </p:cNvPr>
+          <p:cNvSpPr txBox="1"/>
+          <p:nvPr/>
+        </p:nvSpPr>
+        <p:spPr>
+          <a:xfrm>
+            <a:off x="15425732" y="4654801"/>
+            <a:ext cx="13372288" cy="8863965"/>
+          </a:xfrm>
+          <a:prstGeom prst="rect">
+            <a:avLst/>
+          </a:prstGeom>
+          <a:noFill/>
+        </p:spPr>
+        <p:txBody>
+          <a:bodyPr wrap="square" rtlCol="0">
+            <a:spAutoFit/>
+          </a:bodyPr>
+          <a:lstStyle/>
+          <a:p>
+            <a:pPr algn="just">
               <a:spcAft>
                 <a:spcPts val="1200"/>
               </a:spcAft>
-              <a:buAutoNum type="arabicPeriod"/>
             </a:pPr>
             <a:r>
               <a:rPr lang="en-US" sz="4000" dirty="0"/>
-              <a:t>Compute solar energy </a:t>
-            </a:r>
-          </a:p>
-        </p:txBody>
-      </p:sp>
+              <a:t>After masking, the remaining areas are used to calculate solar radiation. </a:t>
+            </a:r>
+            <a:r>
+              <a:rPr lang="en-US" sz="4000" dirty="0" err="1"/>
+              <a:t>Arcgis</a:t>
+            </a:r>
+            <a:r>
+              <a:rPr lang="en-US" sz="4000" dirty="0"/>
+              <a:t> has a powerful tool -- Solar Radiation tool, which can derive incoming solar radiation during a year. This is based on </a:t>
+            </a:r>
+            <a:r>
+              <a:rPr lang="en-US" sz="4000" b="1" dirty="0"/>
+              <a:t>hemispherical viewshed algorithm </a:t>
+            </a:r>
+            <a:r>
+              <a:rPr lang="en-US" sz="4000" dirty="0"/>
+              <a:t>developed by Rich and Fu, taking into account direct radiation and diffuse radiation. However, compared to System Advisor Model (SAM), this tool neglects local meteorological</a:t>
+            </a:r>
+            <a:r>
+              <a:rPr lang="zh-CN" altLang="en-US" sz="4000" dirty="0"/>
+              <a:t> </a:t>
+            </a:r>
+            <a:r>
+              <a:rPr lang="en-US" altLang="zh-CN" sz="4000" dirty="0"/>
+              <a:t>data, making the results less accurate.</a:t>
+            </a:r>
+            <a:endParaRPr lang="en-US" sz="4000" dirty="0"/>
+          </a:p>
+          <a:p>
+            <a:pPr algn="just"/>
+            <a:r>
+              <a:rPr lang="en-US" sz="4000" b="1" dirty="0"/>
+              <a:t>3. Compute Solar Energy</a:t>
+            </a:r>
+          </a:p>
+          <a:p>
+            <a:pPr algn="just"/>
+            <a:r>
+              <a:rPr lang="en-US" sz="4000" dirty="0"/>
+              <a:t>Combining area of rooftops or parking lots and solar radiation they collect, we can attain the overall solar energy they produce. When converting into </a:t>
+            </a:r>
+            <a:r>
+              <a:rPr lang="en-US" sz="4000" dirty="0" err="1"/>
+              <a:t>kml</a:t>
+            </a:r>
+            <a:r>
+              <a:rPr lang="en-US" sz="4000" dirty="0"/>
+              <a:t> files, which can open by Google Earth Pro and Google Map, one can easily decide if it is worthwhile to planting solar panels in this specific location.</a:t>
+            </a:r>
+          </a:p>
+        </p:txBody>
+      </p:sp>
+      <p:sp>
+        <p:nvSpPr>
+          <p:cNvPr id="29" name="TextBox 28">
+            <a:extLst>
+              <a:ext uri="{FF2B5EF4-FFF2-40B4-BE49-F238E27FC236}">
+                <a16:creationId xmlns:a16="http://schemas.microsoft.com/office/drawing/2014/main" id="{9F33EA44-5A94-6F40-9E72-F124B4B0059A}"/>
+              </a:ext>
+            </a:extLst>
+          </p:cNvPr>
+          <p:cNvSpPr txBox="1"/>
+          <p:nvPr/>
+        </p:nvSpPr>
+        <p:spPr>
+          <a:xfrm>
+            <a:off x="29733540" y="6452630"/>
+            <a:ext cx="13372288" cy="1477328"/>
+          </a:xfrm>
+          <a:prstGeom prst="rect">
+            <a:avLst/>
+          </a:prstGeom>
+          <a:noFill/>
+        </p:spPr>
+        <p:txBody>
+          <a:bodyPr wrap="square" rtlCol="0">
+            <a:spAutoFit/>
+          </a:bodyPr>
+          <a:lstStyle/>
+          <a:p>
+            <a:pPr algn="just">
+              <a:spcAft>
+                <a:spcPts val="1200"/>
+              </a:spcAft>
+            </a:pPr>
+            <a:r>
+              <a:rPr lang="en-US" sz="4000" dirty="0" err="1"/>
+              <a:t>Sadffd</a:t>
+            </a:r>
+            <a:endParaRPr lang="en-US" sz="4000" dirty="0"/>
+          </a:p>
+          <a:p>
+            <a:pPr algn="just">
+              <a:spcAft>
+                <a:spcPts val="1200"/>
+              </a:spcAft>
+            </a:pPr>
+            <a:endParaRPr lang="en-US" sz="4000" dirty="0"/>
+          </a:p>
+        </p:txBody>
+      </p:sp>
+      <p:pic>
+        <p:nvPicPr>
+          <p:cNvPr id="18" name="Picture 17">
+            <a:extLst>
+              <a:ext uri="{FF2B5EF4-FFF2-40B4-BE49-F238E27FC236}">
+                <a16:creationId xmlns:a16="http://schemas.microsoft.com/office/drawing/2014/main" id="{745BF4C6-F08A-2642-8B41-BE5DE83F2A42}"/>
+              </a:ext>
+            </a:extLst>
+          </p:cNvPr>
+          <p:cNvPicPr>
+            <a:picLocks noChangeAspect="1"/>
+          </p:cNvPicPr>
+          <p:nvPr/>
+        </p:nvPicPr>
+        <p:blipFill>
+          <a:blip r:embed="rId4"/>
+          <a:stretch>
+            <a:fillRect/>
+          </a:stretch>
+        </p:blipFill>
+        <p:spPr>
+          <a:xfrm>
+            <a:off x="15228997" y="13749097"/>
+            <a:ext cx="13791921" cy="5710717"/>
+          </a:xfrm>
+          <a:prstGeom prst="rect">
+            <a:avLst/>
+          </a:prstGeom>
+        </p:spPr>
+      </p:pic>
     </p:spTree>
     <p:extLst>
       <p:ext uri="{BB962C8B-B14F-4D97-AF65-F5344CB8AC3E}">

</xml_diff>

<commit_message>
create 1 slide for showcase
</commit_message>
<xml_diff>
--- a/doc/ASAP_capstone.pptx
+++ b/doc/ASAP_capstone.pptx
@@ -243,7 +243,7 @@
           <a:p>
             <a:fld id="{334C27A1-BEB2-C84C-8355-1158A44B1DD2}" type="datetimeFigureOut">
               <a:rPr lang="en-US" smtClean="0"/>
-              <a:t>6/20/18</a:t>
+              <a:t>6/24/18</a:t>
             </a:fld>
             <a:endParaRPr lang="en-US"/>
           </a:p>
@@ -413,7 +413,7 @@
           <a:p>
             <a:fld id="{334C27A1-BEB2-C84C-8355-1158A44B1DD2}" type="datetimeFigureOut">
               <a:rPr lang="en-US" smtClean="0"/>
-              <a:t>6/20/18</a:t>
+              <a:t>6/24/18</a:t>
             </a:fld>
             <a:endParaRPr lang="en-US"/>
           </a:p>
@@ -593,7 +593,7 @@
           <a:p>
             <a:fld id="{334C27A1-BEB2-C84C-8355-1158A44B1DD2}" type="datetimeFigureOut">
               <a:rPr lang="en-US" smtClean="0"/>
-              <a:t>6/20/18</a:t>
+              <a:t>6/24/18</a:t>
             </a:fld>
             <a:endParaRPr lang="en-US"/>
           </a:p>
@@ -763,7 +763,7 @@
           <a:p>
             <a:fld id="{334C27A1-BEB2-C84C-8355-1158A44B1DD2}" type="datetimeFigureOut">
               <a:rPr lang="en-US" smtClean="0"/>
-              <a:t>6/20/18</a:t>
+              <a:t>6/24/18</a:t>
             </a:fld>
             <a:endParaRPr lang="en-US"/>
           </a:p>
@@ -1007,7 +1007,7 @@
           <a:p>
             <a:fld id="{334C27A1-BEB2-C84C-8355-1158A44B1DD2}" type="datetimeFigureOut">
               <a:rPr lang="en-US" smtClean="0"/>
-              <a:t>6/20/18</a:t>
+              <a:t>6/24/18</a:t>
             </a:fld>
             <a:endParaRPr lang="en-US"/>
           </a:p>
@@ -1239,7 +1239,7 @@
           <a:p>
             <a:fld id="{334C27A1-BEB2-C84C-8355-1158A44B1DD2}" type="datetimeFigureOut">
               <a:rPr lang="en-US" smtClean="0"/>
-              <a:t>6/20/18</a:t>
+              <a:t>6/24/18</a:t>
             </a:fld>
             <a:endParaRPr lang="en-US"/>
           </a:p>
@@ -1606,7 +1606,7 @@
           <a:p>
             <a:fld id="{334C27A1-BEB2-C84C-8355-1158A44B1DD2}" type="datetimeFigureOut">
               <a:rPr lang="en-US" smtClean="0"/>
-              <a:t>6/20/18</a:t>
+              <a:t>6/24/18</a:t>
             </a:fld>
             <a:endParaRPr lang="en-US"/>
           </a:p>
@@ -1724,7 +1724,7 @@
           <a:p>
             <a:fld id="{334C27A1-BEB2-C84C-8355-1158A44B1DD2}" type="datetimeFigureOut">
               <a:rPr lang="en-US" smtClean="0"/>
-              <a:t>6/20/18</a:t>
+              <a:t>6/24/18</a:t>
             </a:fld>
             <a:endParaRPr lang="en-US"/>
           </a:p>
@@ -1819,7 +1819,7 @@
           <a:p>
             <a:fld id="{334C27A1-BEB2-C84C-8355-1158A44B1DD2}" type="datetimeFigureOut">
               <a:rPr lang="en-US" smtClean="0"/>
-              <a:t>6/20/18</a:t>
+              <a:t>6/24/18</a:t>
             </a:fld>
             <a:endParaRPr lang="en-US"/>
           </a:p>
@@ -2096,7 +2096,7 @@
           <a:p>
             <a:fld id="{334C27A1-BEB2-C84C-8355-1158A44B1DD2}" type="datetimeFigureOut">
               <a:rPr lang="en-US" smtClean="0"/>
-              <a:t>6/20/18</a:t>
+              <a:t>6/24/18</a:t>
             </a:fld>
             <a:endParaRPr lang="en-US"/>
           </a:p>
@@ -2353,7 +2353,7 @@
           <a:p>
             <a:fld id="{334C27A1-BEB2-C84C-8355-1158A44B1DD2}" type="datetimeFigureOut">
               <a:rPr lang="en-US" smtClean="0"/>
-              <a:t>6/20/18</a:t>
+              <a:t>6/24/18</a:t>
             </a:fld>
             <a:endParaRPr lang="en-US"/>
           </a:p>
@@ -2566,7 +2566,7 @@
           <a:p>
             <a:fld id="{334C27A1-BEB2-C84C-8355-1158A44B1DD2}" type="datetimeFigureOut">
               <a:rPr lang="en-US" smtClean="0"/>
-              <a:t>6/20/18</a:t>
+              <a:t>6/24/18</a:t>
             </a:fld>
             <a:endParaRPr lang="en-US"/>
           </a:p>
@@ -3001,7 +3001,7 @@
         </p:blipFill>
         <p:spPr>
           <a:xfrm>
-            <a:off x="0" y="28720390"/>
+            <a:off x="-92744" y="28762128"/>
             <a:ext cx="14582956" cy="4014409"/>
           </a:xfrm>
           <a:prstGeom prst="rect">
@@ -3322,129 +3322,6 @@
       </p:sp>
       <p:sp>
         <p:nvSpPr>
-          <p:cNvPr id="12" name="TextBox 11">
-            <a:extLst>
-              <a:ext uri="{FF2B5EF4-FFF2-40B4-BE49-F238E27FC236}">
-                <a16:creationId xmlns:a16="http://schemas.microsoft.com/office/drawing/2014/main" id="{20FDD4B6-0F73-D24B-A318-E8EC3C326961}"/>
-              </a:ext>
-            </a:extLst>
-          </p:cNvPr>
-          <p:cNvSpPr txBox="1"/>
-          <p:nvPr/>
-        </p:nvSpPr>
-        <p:spPr>
-          <a:xfrm>
-            <a:off x="36419684" y="29497083"/>
-            <a:ext cx="6381035" cy="2554545"/>
-          </a:xfrm>
-          <a:prstGeom prst="rect">
-            <a:avLst/>
-          </a:prstGeom>
-          <a:noFill/>
-        </p:spPr>
-        <p:txBody>
-          <a:bodyPr wrap="square" rtlCol="0">
-            <a:spAutoFit/>
-          </a:bodyPr>
-          <a:lstStyle/>
-          <a:p>
-            <a:pPr algn="ctr"/>
-            <a:r>
-              <a:rPr lang="en-US" sz="8000" b="1" dirty="0"/>
-              <a:t>DEPARTMENT</a:t>
-            </a:r>
-          </a:p>
-          <a:p>
-            <a:pPr algn="ctr"/>
-            <a:r>
-              <a:rPr lang="en-US" sz="8000" b="1" dirty="0"/>
-              <a:t>LOGO</a:t>
-            </a:r>
-          </a:p>
-        </p:txBody>
-      </p:sp>
-      <p:pic>
-        <p:nvPicPr>
-          <p:cNvPr id="3" name="Picture 2">
-            <a:extLst>
-              <a:ext uri="{FF2B5EF4-FFF2-40B4-BE49-F238E27FC236}">
-                <a16:creationId xmlns:a16="http://schemas.microsoft.com/office/drawing/2014/main" id="{6496DAC3-7391-2441-AD93-9422CA18D230}"/>
-              </a:ext>
-            </a:extLst>
-          </p:cNvPr>
-          <p:cNvPicPr>
-            <a:picLocks noChangeAspect="1"/>
-          </p:cNvPicPr>
-          <p:nvPr/>
-        </p:nvPicPr>
-        <p:blipFill>
-          <a:blip r:embed="rId3"/>
-          <a:stretch>
-            <a:fillRect/>
-          </a:stretch>
-        </p:blipFill>
-        <p:spPr>
-          <a:xfrm>
-            <a:off x="30736309" y="29023486"/>
-            <a:ext cx="5112327" cy="3408218"/>
-          </a:xfrm>
-          <a:prstGeom prst="rect">
-            <a:avLst/>
-          </a:prstGeom>
-        </p:spPr>
-      </p:pic>
-      <p:sp>
-        <p:nvSpPr>
-          <p:cNvPr id="13" name="TextBox 12">
-            <a:extLst>
-              <a:ext uri="{FF2B5EF4-FFF2-40B4-BE49-F238E27FC236}">
-                <a16:creationId xmlns:a16="http://schemas.microsoft.com/office/drawing/2014/main" id="{9C83CFC1-642D-D441-A586-44387BAF74E0}"/>
-              </a:ext>
-            </a:extLst>
-          </p:cNvPr>
-          <p:cNvSpPr txBox="1"/>
-          <p:nvPr/>
-        </p:nvSpPr>
-        <p:spPr>
-          <a:xfrm>
-            <a:off x="13871414" y="28881530"/>
-            <a:ext cx="12438367" cy="3785652"/>
-          </a:xfrm>
-          <a:prstGeom prst="rect">
-            <a:avLst/>
-          </a:prstGeom>
-          <a:noFill/>
-        </p:spPr>
-        <p:txBody>
-          <a:bodyPr wrap="square" rtlCol="0">
-            <a:spAutoFit/>
-          </a:bodyPr>
-          <a:lstStyle/>
-          <a:p>
-            <a:pPr algn="ctr"/>
-            <a:r>
-              <a:rPr lang="en-US" sz="8000" b="1" dirty="0"/>
-              <a:t>Place for:</a:t>
-            </a:r>
-          </a:p>
-          <a:p>
-            <a:pPr algn="ctr"/>
-            <a:r>
-              <a:rPr lang="en-US" sz="8000" b="1" dirty="0"/>
-              <a:t>CEI Logo</a:t>
-            </a:r>
-          </a:p>
-          <a:p>
-            <a:pPr algn="ctr"/>
-            <a:r>
-              <a:rPr lang="en-US" sz="8000" b="1" dirty="0"/>
-              <a:t>Acknowledgements, etc.</a:t>
-            </a:r>
-          </a:p>
-        </p:txBody>
-      </p:sp>
-      <p:sp>
-        <p:nvSpPr>
           <p:cNvPr id="16" name="TextBox 15">
             <a:extLst>
               <a:ext uri="{FF2B5EF4-FFF2-40B4-BE49-F238E27FC236}">
@@ -3663,107 +3540,6 @@
           </a:p>
         </p:txBody>
       </p:sp>
-      <p:grpSp>
-        <p:nvGrpSpPr>
-          <p:cNvPr id="14" name="Group 13">
-            <a:extLst>
-              <a:ext uri="{FF2B5EF4-FFF2-40B4-BE49-F238E27FC236}">
-                <a16:creationId xmlns:a16="http://schemas.microsoft.com/office/drawing/2014/main" id="{B899183F-4919-9447-BB1E-1083E73CA025}"/>
-              </a:ext>
-            </a:extLst>
-          </p:cNvPr>
-          <p:cNvGrpSpPr/>
-          <p:nvPr/>
-        </p:nvGrpSpPr>
-        <p:grpSpPr>
-          <a:xfrm>
-            <a:off x="17524357" y="23559007"/>
-            <a:ext cx="8842485" cy="2367619"/>
-            <a:chOff x="17503317" y="17275519"/>
-            <a:chExt cx="8842485" cy="2367619"/>
-          </a:xfrm>
-        </p:grpSpPr>
-        <p:sp>
-          <p:nvSpPr>
-            <p:cNvPr id="24" name="TextBox 23">
-              <a:extLst>
-                <a:ext uri="{FF2B5EF4-FFF2-40B4-BE49-F238E27FC236}">
-                  <a16:creationId xmlns:a16="http://schemas.microsoft.com/office/drawing/2014/main" id="{2542872F-456D-1D4B-9F3B-DB802A3450E9}"/>
-                </a:ext>
-              </a:extLst>
-            </p:cNvPr>
-            <p:cNvSpPr txBox="1"/>
-            <p:nvPr/>
-          </p:nvSpPr>
-          <p:spPr>
-            <a:xfrm>
-              <a:off x="17503317" y="17275519"/>
-              <a:ext cx="8842485" cy="1015663"/>
-            </a:xfrm>
-            <a:prstGeom prst="rect">
-              <a:avLst/>
-            </a:prstGeom>
-            <a:noFill/>
-          </p:spPr>
-          <p:txBody>
-            <a:bodyPr wrap="none" rtlCol="0">
-              <a:spAutoFit/>
-            </a:bodyPr>
-            <a:lstStyle/>
-            <a:p>
-              <a:r>
-                <a:rPr lang="en-US" sz="6000" dirty="0"/>
-                <a:t>Model builder from </a:t>
-              </a:r>
-              <a:r>
-                <a:rPr lang="en-US" sz="6000" dirty="0" err="1"/>
-                <a:t>Jingtian</a:t>
-              </a:r>
-              <a:endParaRPr lang="en-US" sz="6000" dirty="0"/>
-            </a:p>
-          </p:txBody>
-        </p:sp>
-        <p:sp>
-          <p:nvSpPr>
-            <p:cNvPr id="25" name="TextBox 24">
-              <a:extLst>
-                <a:ext uri="{FF2B5EF4-FFF2-40B4-BE49-F238E27FC236}">
-                  <a16:creationId xmlns:a16="http://schemas.microsoft.com/office/drawing/2014/main" id="{06337C75-2175-6640-A8CE-11E362B23A5A}"/>
-                </a:ext>
-              </a:extLst>
-            </p:cNvPr>
-            <p:cNvSpPr txBox="1"/>
-            <p:nvPr/>
-          </p:nvSpPr>
-          <p:spPr>
-            <a:xfrm>
-              <a:off x="19205738" y="18627475"/>
-              <a:ext cx="5437642" cy="1015663"/>
-            </a:xfrm>
-            <a:prstGeom prst="rect">
-              <a:avLst/>
-            </a:prstGeom>
-            <a:noFill/>
-          </p:spPr>
-          <p:txBody>
-            <a:bodyPr wrap="none" rtlCol="0">
-              <a:spAutoFit/>
-            </a:bodyPr>
-            <a:lstStyle/>
-            <a:p>
-              <a:r>
-                <a:rPr lang="en-US" sz="6000" dirty="0"/>
-                <a:t>Workflow </a:t>
-              </a:r>
-              <a:r>
-                <a:rPr lang="en-US" sz="6000" dirty="0" err="1"/>
-                <a:t>XMind</a:t>
-              </a:r>
-              <a:endParaRPr lang="en-US" sz="6000" dirty="0"/>
-            </a:p>
-          </p:txBody>
-        </p:sp>
-      </p:grpSp>
       <p:sp>
         <p:nvSpPr>
           <p:cNvPr id="26" name="TextBox 25">
@@ -4098,6 +3874,36 @@
           <p:nvPr/>
         </p:nvPicPr>
         <p:blipFill>
+          <a:blip r:embed="rId3"/>
+          <a:stretch>
+            <a:fillRect/>
+          </a:stretch>
+        </p:blipFill>
+        <p:spPr>
+          <a:xfrm>
+            <a:off x="15228997" y="13749097"/>
+            <a:ext cx="13791921" cy="5710717"/>
+          </a:xfrm>
+          <a:prstGeom prst="rect">
+            <a:avLst/>
+          </a:prstGeom>
+        </p:spPr>
+      </p:pic>
+      <p:pic>
+        <p:nvPicPr>
+          <p:cNvPr id="30" name="Picture 29">
+            <a:extLst>
+              <a:ext uri="{FF2B5EF4-FFF2-40B4-BE49-F238E27FC236}">
+                <a16:creationId xmlns:a16="http://schemas.microsoft.com/office/drawing/2014/main" id="{C10C417F-A657-B347-BDB6-DC69502813D4}"/>
+              </a:ext>
+            </a:extLst>
+          </p:cNvPr>
+          <p:cNvPicPr>
+            <a:picLocks noChangeAspect="1"/>
+          </p:cNvPicPr>
+          <p:nvPr/>
+        </p:nvPicPr>
+        <p:blipFill>
           <a:blip r:embed="rId4"/>
           <a:stretch>
             <a:fillRect/>
@@ -4105,8 +3911,68 @@
         </p:blipFill>
         <p:spPr>
           <a:xfrm>
-            <a:off x="15228997" y="13749097"/>
-            <a:ext cx="13791921" cy="5710717"/>
+            <a:off x="15228997" y="20178203"/>
+            <a:ext cx="13791921" cy="6321753"/>
+          </a:xfrm>
+          <a:prstGeom prst="rect">
+            <a:avLst/>
+          </a:prstGeom>
+        </p:spPr>
+      </p:pic>
+      <p:pic>
+        <p:nvPicPr>
+          <p:cNvPr id="19" name="Picture 18">
+            <a:extLst>
+              <a:ext uri="{FF2B5EF4-FFF2-40B4-BE49-F238E27FC236}">
+                <a16:creationId xmlns:a16="http://schemas.microsoft.com/office/drawing/2014/main" id="{F5A4AA79-62C7-9A48-B701-2CE960A715F7}"/>
+              </a:ext>
+            </a:extLst>
+          </p:cNvPr>
+          <p:cNvPicPr>
+            <a:picLocks noChangeAspect="1"/>
+          </p:cNvPicPr>
+          <p:nvPr/>
+        </p:nvPicPr>
+        <p:blipFill>
+          <a:blip r:embed="rId5"/>
+          <a:stretch>
+            <a:fillRect/>
+          </a:stretch>
+        </p:blipFill>
+        <p:spPr>
+          <a:xfrm>
+            <a:off x="14702076" y="28803868"/>
+            <a:ext cx="13458644" cy="3930931"/>
+          </a:xfrm>
+          <a:prstGeom prst="rect">
+            <a:avLst/>
+          </a:prstGeom>
+        </p:spPr>
+      </p:pic>
+      <p:pic>
+        <p:nvPicPr>
+          <p:cNvPr id="34" name="Picture 33">
+            <a:extLst>
+              <a:ext uri="{FF2B5EF4-FFF2-40B4-BE49-F238E27FC236}">
+                <a16:creationId xmlns:a16="http://schemas.microsoft.com/office/drawing/2014/main" id="{63756A44-AD86-474C-8DCD-C5A171C74CB3}"/>
+              </a:ext>
+            </a:extLst>
+          </p:cNvPr>
+          <p:cNvPicPr>
+            <a:picLocks noChangeAspect="1"/>
+          </p:cNvPicPr>
+          <p:nvPr/>
+        </p:nvPicPr>
+        <p:blipFill>
+          <a:blip r:embed="rId6"/>
+          <a:stretch>
+            <a:fillRect/>
+          </a:stretch>
+        </p:blipFill>
+        <p:spPr>
+          <a:xfrm>
+            <a:off x="30182931" y="29465394"/>
+            <a:ext cx="12473505" cy="2524400"/>
           </a:xfrm>
           <a:prstGeom prst="rect">
             <a:avLst/>

</xml_diff>